<commit_message>
Schrittmotor Theorie fertig und Schnittstellenkonzept fertig
</commit_message>
<xml_diff>
--- a/Doku/externalFiles/Schnittstellen.pptx
+++ b/Doku/externalFiles/Schnittstellen.pptx
@@ -6,6 +6,7 @@
   </p:sldMasterIdLst>
   <p:sldIdLst>
     <p:sldId id="256" r:id="rId2"/>
+    <p:sldId id="257" r:id="rId3"/>
   </p:sldIdLst>
   <p:sldSz cx="12192000" cy="6858000"/>
   <p:notesSz cx="6858000" cy="9144000"/>
@@ -104,6 +105,11 @@
       </a:defRPr>
     </a:lvl9pPr>
   </p:defaultTextStyle>
+  <p:extLst>
+    <p:ext uri="{EFAFB233-063F-42B5-8137-9DF3F51BA10A}">
+      <p15:sldGuideLst xmlns:p15="http://schemas.microsoft.com/office/powerpoint/2012/main"/>
+    </p:ext>
+  </p:extLst>
 </p:presentation>
 </file>
 
@@ -254,7 +260,7 @@
           <a:p>
             <a:fld id="{4F6FAB17-18BB-415E-96CC-1A433FAD54E4}" type="datetimeFigureOut">
               <a:rPr lang="de-DE" smtClean="0"/>
-              <a:t>15.11.2021</a:t>
+              <a:t>19.11.21</a:t>
             </a:fld>
             <a:endParaRPr lang="de-DE"/>
           </a:p>
@@ -452,7 +458,7 @@
           <a:p>
             <a:fld id="{4F6FAB17-18BB-415E-96CC-1A433FAD54E4}" type="datetimeFigureOut">
               <a:rPr lang="de-DE" smtClean="0"/>
-              <a:t>15.11.2021</a:t>
+              <a:t>19.11.21</a:t>
             </a:fld>
             <a:endParaRPr lang="de-DE"/>
           </a:p>
@@ -660,7 +666,7 @@
           <a:p>
             <a:fld id="{4F6FAB17-18BB-415E-96CC-1A433FAD54E4}" type="datetimeFigureOut">
               <a:rPr lang="de-DE" smtClean="0"/>
-              <a:t>15.11.2021</a:t>
+              <a:t>19.11.21</a:t>
             </a:fld>
             <a:endParaRPr lang="de-DE"/>
           </a:p>
@@ -858,7 +864,7 @@
           <a:p>
             <a:fld id="{4F6FAB17-18BB-415E-96CC-1A433FAD54E4}" type="datetimeFigureOut">
               <a:rPr lang="de-DE" smtClean="0"/>
-              <a:t>15.11.2021</a:t>
+              <a:t>19.11.21</a:t>
             </a:fld>
             <a:endParaRPr lang="de-DE"/>
           </a:p>
@@ -1133,7 +1139,7 @@
           <a:p>
             <a:fld id="{4F6FAB17-18BB-415E-96CC-1A433FAD54E4}" type="datetimeFigureOut">
               <a:rPr lang="de-DE" smtClean="0"/>
-              <a:t>15.11.2021</a:t>
+              <a:t>19.11.21</a:t>
             </a:fld>
             <a:endParaRPr lang="de-DE"/>
           </a:p>
@@ -1398,7 +1404,7 @@
           <a:p>
             <a:fld id="{4F6FAB17-18BB-415E-96CC-1A433FAD54E4}" type="datetimeFigureOut">
               <a:rPr lang="de-DE" smtClean="0"/>
-              <a:t>15.11.2021</a:t>
+              <a:t>19.11.21</a:t>
             </a:fld>
             <a:endParaRPr lang="de-DE"/>
           </a:p>
@@ -1810,7 +1816,7 @@
           <a:p>
             <a:fld id="{4F6FAB17-18BB-415E-96CC-1A433FAD54E4}" type="datetimeFigureOut">
               <a:rPr lang="de-DE" smtClean="0"/>
-              <a:t>15.11.2021</a:t>
+              <a:t>19.11.21</a:t>
             </a:fld>
             <a:endParaRPr lang="de-DE"/>
           </a:p>
@@ -1951,7 +1957,7 @@
           <a:p>
             <a:fld id="{4F6FAB17-18BB-415E-96CC-1A433FAD54E4}" type="datetimeFigureOut">
               <a:rPr lang="de-DE" smtClean="0"/>
-              <a:t>15.11.2021</a:t>
+              <a:t>19.11.21</a:t>
             </a:fld>
             <a:endParaRPr lang="de-DE"/>
           </a:p>
@@ -2064,7 +2070,7 @@
           <a:p>
             <a:fld id="{4F6FAB17-18BB-415E-96CC-1A433FAD54E4}" type="datetimeFigureOut">
               <a:rPr lang="de-DE" smtClean="0"/>
-              <a:t>15.11.2021</a:t>
+              <a:t>19.11.21</a:t>
             </a:fld>
             <a:endParaRPr lang="de-DE"/>
           </a:p>
@@ -2375,7 +2381,7 @@
           <a:p>
             <a:fld id="{4F6FAB17-18BB-415E-96CC-1A433FAD54E4}" type="datetimeFigureOut">
               <a:rPr lang="de-DE" smtClean="0"/>
-              <a:t>15.11.2021</a:t>
+              <a:t>19.11.21</a:t>
             </a:fld>
             <a:endParaRPr lang="de-DE"/>
           </a:p>
@@ -2663,7 +2669,7 @@
           <a:p>
             <a:fld id="{4F6FAB17-18BB-415E-96CC-1A433FAD54E4}" type="datetimeFigureOut">
               <a:rPr lang="de-DE" smtClean="0"/>
-              <a:t>15.11.2021</a:t>
+              <a:t>19.11.21</a:t>
             </a:fld>
             <a:endParaRPr lang="de-DE"/>
           </a:p>
@@ -2904,7 +2910,7 @@
           <a:p>
             <a:fld id="{4F6FAB17-18BB-415E-96CC-1A433FAD54E4}" type="datetimeFigureOut">
               <a:rPr lang="de-DE" smtClean="0"/>
-              <a:t>15.11.2021</a:t>
+              <a:t>19.11.21</a:t>
             </a:fld>
             <a:endParaRPr lang="de-DE"/>
           </a:p>
@@ -3341,6 +3347,9 @@
           <a:prstGeom prst="roundRect">
             <a:avLst/>
           </a:prstGeom>
+          <a:ln>
+            <a:noFill/>
+          </a:ln>
         </p:spPr>
         <p:style>
           <a:lnRef idx="2">
@@ -3395,6 +3404,9 @@
               <a:lumMod val="75000"/>
             </a:schemeClr>
           </a:solidFill>
+          <a:ln>
+            <a:noFill/>
+          </a:ln>
         </p:spPr>
         <p:style>
           <a:lnRef idx="2">
@@ -3454,6 +3466,9 @@
           <a:solidFill>
             <a:srgbClr val="FF0000"/>
           </a:solidFill>
+          <a:ln>
+            <a:noFill/>
+          </a:ln>
         </p:spPr>
         <p:style>
           <a:lnRef idx="2">
@@ -3508,6 +3523,9 @@
               <a:lumMod val="75000"/>
             </a:schemeClr>
           </a:solidFill>
+          <a:ln>
+            <a:noFill/>
+          </a:ln>
         </p:spPr>
         <p:style>
           <a:lnRef idx="2">
@@ -3573,8 +3591,13 @@
             <a:avLst/>
           </a:prstGeom>
           <a:solidFill>
-            <a:srgbClr val="FFC000"/>
+            <a:schemeClr val="bg1">
+              <a:lumMod val="50000"/>
+            </a:schemeClr>
           </a:solidFill>
+          <a:ln>
+            <a:noFill/>
+          </a:ln>
         </p:spPr>
         <p:style>
           <a:lnRef idx="2">
@@ -3629,6 +3652,9 @@
               <a:lumMod val="75000"/>
             </a:schemeClr>
           </a:solidFill>
+          <a:ln>
+            <a:noFill/>
+          </a:ln>
         </p:spPr>
         <p:style>
           <a:lnRef idx="2">
@@ -3694,6 +3720,9 @@
               <a:lumOff val="40000"/>
             </a:schemeClr>
           </a:solidFill>
+          <a:ln>
+            <a:noFill/>
+          </a:ln>
         </p:spPr>
         <p:style>
           <a:lnRef idx="2">
@@ -3749,6 +3778,9 @@
           <a:solidFill>
             <a:srgbClr val="C00000"/>
           </a:solidFill>
+          <a:ln>
+            <a:noFill/>
+          </a:ln>
         </p:spPr>
         <p:style>
           <a:lnRef idx="2">
@@ -3780,10 +3812,10 @@
       </p:sp>
       <p:sp>
         <p:nvSpPr>
-          <p:cNvPr id="13" name="Pfeil: nach links und rechts 12">
-            <a:extLst>
-              <a:ext uri="{FF2B5EF4-FFF2-40B4-BE49-F238E27FC236}">
-                <a16:creationId xmlns:a16="http://schemas.microsoft.com/office/drawing/2014/main" id="{50AB7B7E-649B-4D77-9F7A-E4AFCCD1DB82}"/>
+          <p:cNvPr id="14" name="Rechteck: abgerundete Ecken 13">
+            <a:extLst>
+              <a:ext uri="{FF2B5EF4-FFF2-40B4-BE49-F238E27FC236}">
+                <a16:creationId xmlns:a16="http://schemas.microsoft.com/office/drawing/2014/main" id="{EC5501FC-D75A-44B3-9F9C-AD1933593C99}"/>
               </a:ext>
             </a:extLst>
           </p:cNvPr>
@@ -3792,7 +3824,525 @@
         </p:nvSpPr>
         <p:spPr>
           <a:xfrm>
-            <a:off x="6161843" y="1451500"/>
+            <a:off x="9210211" y="3462291"/>
+            <a:ext cx="1863201" cy="719092"/>
+          </a:xfrm>
+          <a:prstGeom prst="roundRect">
+            <a:avLst/>
+          </a:prstGeom>
+          <a:solidFill>
+            <a:schemeClr val="bg1">
+              <a:lumMod val="50000"/>
+            </a:schemeClr>
+          </a:solidFill>
+          <a:ln>
+            <a:noFill/>
+          </a:ln>
+        </p:spPr>
+        <p:style>
+          <a:lnRef idx="2">
+            <a:schemeClr val="accent1">
+              <a:shade val="50000"/>
+            </a:schemeClr>
+          </a:lnRef>
+          <a:fillRef idx="1">
+            <a:schemeClr val="accent1"/>
+          </a:fillRef>
+          <a:effectRef idx="0">
+            <a:schemeClr val="accent1"/>
+          </a:effectRef>
+          <a:fontRef idx="minor">
+            <a:schemeClr val="lt1"/>
+          </a:fontRef>
+        </p:style>
+        <p:txBody>
+          <a:bodyPr rtlCol="0" anchor="ctr"/>
+          <a:lstStyle/>
+          <a:p>
+            <a:pPr algn="ctr"/>
+            <a:r>
+              <a:rPr lang="de-DE" dirty="0"/>
+              <a:t>Arduino Distanzmessung</a:t>
+            </a:r>
+          </a:p>
+        </p:txBody>
+      </p:sp>
+      <p:sp>
+        <p:nvSpPr>
+          <p:cNvPr id="15" name="Rechteck: abgerundete Ecken 14">
+            <a:extLst>
+              <a:ext uri="{FF2B5EF4-FFF2-40B4-BE49-F238E27FC236}">
+                <a16:creationId xmlns:a16="http://schemas.microsoft.com/office/drawing/2014/main" id="{31F0726B-78D7-44E7-9FC0-554BE2B609A7}"/>
+              </a:ext>
+            </a:extLst>
+          </p:cNvPr>
+          <p:cNvSpPr/>
+          <p:nvPr/>
+        </p:nvSpPr>
+        <p:spPr>
+          <a:xfrm>
+            <a:off x="7401758" y="3462291"/>
+            <a:ext cx="1306496" cy="719092"/>
+          </a:xfrm>
+          <a:prstGeom prst="roundRect">
+            <a:avLst/>
+          </a:prstGeom>
+          <a:solidFill>
+            <a:schemeClr val="bg1">
+              <a:lumMod val="50000"/>
+            </a:schemeClr>
+          </a:solidFill>
+          <a:ln>
+            <a:noFill/>
+          </a:ln>
+        </p:spPr>
+        <p:style>
+          <a:lnRef idx="2">
+            <a:schemeClr val="accent1">
+              <a:shade val="50000"/>
+            </a:schemeClr>
+          </a:lnRef>
+          <a:fillRef idx="1">
+            <a:schemeClr val="accent1"/>
+          </a:fillRef>
+          <a:effectRef idx="0">
+            <a:schemeClr val="accent1"/>
+          </a:effectRef>
+          <a:fontRef idx="minor">
+            <a:schemeClr val="lt1"/>
+          </a:fontRef>
+        </p:style>
+        <p:txBody>
+          <a:bodyPr rtlCol="0" anchor="ctr"/>
+          <a:lstStyle/>
+          <a:p>
+            <a:pPr algn="ctr"/>
+            <a:r>
+              <a:rPr lang="de-DE" dirty="0"/>
+              <a:t>Arduino Motor</a:t>
+            </a:r>
+          </a:p>
+        </p:txBody>
+      </p:sp>
+      <p:cxnSp>
+        <p:nvCxnSpPr>
+          <p:cNvPr id="17" name="Verbinder: gewinkelt 16">
+            <a:extLst>
+              <a:ext uri="{FF2B5EF4-FFF2-40B4-BE49-F238E27FC236}">
+                <a16:creationId xmlns:a16="http://schemas.microsoft.com/office/drawing/2014/main" id="{1FAEFBB1-B164-4CD1-8BC2-3CF82AFDC495}"/>
+              </a:ext>
+            </a:extLst>
+          </p:cNvPr>
+          <p:cNvCxnSpPr>
+            <a:cxnSpLocks/>
+            <a:stCxn id="14" idx="0"/>
+            <a:endCxn id="9" idx="3"/>
+          </p:cNvCxnSpPr>
+          <p:nvPr/>
+        </p:nvCxnSpPr>
+        <p:spPr>
+          <a:xfrm rot="16200000" flipV="1">
+            <a:off x="8872769" y="2193248"/>
+            <a:ext cx="1651245" cy="886842"/>
+          </a:xfrm>
+          <a:prstGeom prst="bentConnector2">
+            <a:avLst/>
+          </a:prstGeom>
+          <a:ln>
+            <a:tailEnd type="triangle"/>
+          </a:ln>
+        </p:spPr>
+        <p:style>
+          <a:lnRef idx="1">
+            <a:schemeClr val="accent1"/>
+          </a:lnRef>
+          <a:fillRef idx="0">
+            <a:schemeClr val="accent1"/>
+          </a:fillRef>
+          <a:effectRef idx="0">
+            <a:schemeClr val="accent1"/>
+          </a:effectRef>
+          <a:fontRef idx="minor">
+            <a:schemeClr val="tx1"/>
+          </a:fontRef>
+        </p:style>
+      </p:cxnSp>
+      <p:cxnSp>
+        <p:nvCxnSpPr>
+          <p:cNvPr id="21" name="Verbinder: gewinkelt 20">
+            <a:extLst>
+              <a:ext uri="{FF2B5EF4-FFF2-40B4-BE49-F238E27FC236}">
+                <a16:creationId xmlns:a16="http://schemas.microsoft.com/office/drawing/2014/main" id="{8BBA6297-C575-4D73-9F70-0C092B4DB125}"/>
+              </a:ext>
+            </a:extLst>
+          </p:cNvPr>
+          <p:cNvCxnSpPr>
+            <a:cxnSpLocks/>
+          </p:cNvCxnSpPr>
+          <p:nvPr/>
+        </p:nvCxnSpPr>
+        <p:spPr>
+          <a:xfrm rot="16200000" flipV="1">
+            <a:off x="8937595" y="1986378"/>
+            <a:ext cx="1793288" cy="1158538"/>
+          </a:xfrm>
+          <a:prstGeom prst="bentConnector3">
+            <a:avLst>
+              <a:gd name="adj1" fmla="val 100495"/>
+            </a:avLst>
+          </a:prstGeom>
+          <a:ln>
+            <a:tailEnd type="triangle"/>
+          </a:ln>
+        </p:spPr>
+        <p:style>
+          <a:lnRef idx="1">
+            <a:schemeClr val="accent1"/>
+          </a:lnRef>
+          <a:fillRef idx="0">
+            <a:schemeClr val="accent1"/>
+          </a:fillRef>
+          <a:effectRef idx="0">
+            <a:schemeClr val="accent1"/>
+          </a:effectRef>
+          <a:fontRef idx="minor">
+            <a:schemeClr val="tx1"/>
+          </a:fontRef>
+        </p:style>
+      </p:cxnSp>
+      <p:cxnSp>
+        <p:nvCxnSpPr>
+          <p:cNvPr id="30" name="Gerade Verbindung mit Pfeil 29">
+            <a:extLst>
+              <a:ext uri="{FF2B5EF4-FFF2-40B4-BE49-F238E27FC236}">
+                <a16:creationId xmlns:a16="http://schemas.microsoft.com/office/drawing/2014/main" id="{704CAE75-C62B-46A2-935E-3A57945F765A}"/>
+              </a:ext>
+            </a:extLst>
+          </p:cNvPr>
+          <p:cNvCxnSpPr/>
+          <p:nvPr/>
+        </p:nvCxnSpPr>
+        <p:spPr>
+          <a:xfrm flipV="1">
+            <a:off x="8266590" y="2170592"/>
+            <a:ext cx="0" cy="1291699"/>
+          </a:xfrm>
+          <a:prstGeom prst="straightConnector1">
+            <a:avLst/>
+          </a:prstGeom>
+          <a:ln>
+            <a:headEnd type="triangle"/>
+            <a:tailEnd type="triangle"/>
+          </a:ln>
+        </p:spPr>
+        <p:style>
+          <a:lnRef idx="1">
+            <a:schemeClr val="accent1"/>
+          </a:lnRef>
+          <a:fillRef idx="0">
+            <a:schemeClr val="accent1"/>
+          </a:fillRef>
+          <a:effectRef idx="0">
+            <a:schemeClr val="accent1"/>
+          </a:effectRef>
+          <a:fontRef idx="minor">
+            <a:schemeClr val="tx1"/>
+          </a:fontRef>
+        </p:style>
+      </p:cxnSp>
+      <p:sp>
+        <p:nvSpPr>
+          <p:cNvPr id="31" name="Textfeld 30">
+            <a:extLst>
+              <a:ext uri="{FF2B5EF4-FFF2-40B4-BE49-F238E27FC236}">
+                <a16:creationId xmlns:a16="http://schemas.microsoft.com/office/drawing/2014/main" id="{C64E396E-CE93-4CDD-B4DC-A72DA0C6FFB7}"/>
+              </a:ext>
+            </a:extLst>
+          </p:cNvPr>
+          <p:cNvSpPr txBox="1"/>
+          <p:nvPr/>
+        </p:nvSpPr>
+        <p:spPr>
+          <a:xfrm>
+            <a:off x="7639606" y="2657980"/>
+            <a:ext cx="577402" cy="276999"/>
+          </a:xfrm>
+          <a:prstGeom prst="rect">
+            <a:avLst/>
+          </a:prstGeom>
+          <a:noFill/>
+        </p:spPr>
+        <p:txBody>
+          <a:bodyPr wrap="none" rtlCol="0">
+            <a:spAutoFit/>
+          </a:bodyPr>
+          <a:lstStyle/>
+          <a:p>
+            <a:r>
+              <a:rPr lang="de-DE" sz="1200" dirty="0"/>
+              <a:t>RX, TX</a:t>
+            </a:r>
+          </a:p>
+        </p:txBody>
+      </p:sp>
+      <p:sp>
+        <p:nvSpPr>
+          <p:cNvPr id="32" name="Textfeld 31">
+            <a:extLst>
+              <a:ext uri="{FF2B5EF4-FFF2-40B4-BE49-F238E27FC236}">
+                <a16:creationId xmlns:a16="http://schemas.microsoft.com/office/drawing/2014/main" id="{A58F5900-1551-49AD-B770-0D7718724D37}"/>
+              </a:ext>
+            </a:extLst>
+          </p:cNvPr>
+          <p:cNvSpPr txBox="1"/>
+          <p:nvPr/>
+        </p:nvSpPr>
+        <p:spPr>
+          <a:xfrm>
+            <a:off x="8551527" y="2417096"/>
+            <a:ext cx="1885653" cy="738664"/>
+          </a:xfrm>
+          <a:prstGeom prst="rect">
+            <a:avLst/>
+          </a:prstGeom>
+          <a:noFill/>
+        </p:spPr>
+        <p:txBody>
+          <a:bodyPr wrap="square" rtlCol="0">
+            <a:spAutoFit/>
+          </a:bodyPr>
+          <a:lstStyle/>
+          <a:p>
+            <a:r>
+              <a:rPr lang="de-DE" sz="1400" dirty="0"/>
+              <a:t>2 Pins </a:t>
+            </a:r>
+          </a:p>
+          <a:p>
+            <a:r>
+              <a:rPr lang="de-DE" sz="1400" dirty="0"/>
+              <a:t>(</a:t>
+            </a:r>
+            <a:r>
+              <a:rPr lang="de-DE" sz="1400" dirty="0" err="1"/>
+              <a:t>Warnfeld</a:t>
+            </a:r>
+            <a:r>
+              <a:rPr lang="de-DE" sz="1400" dirty="0"/>
+              <a:t>, Schutzfeld)</a:t>
+            </a:r>
+          </a:p>
+          <a:p>
+            <a:r>
+              <a:rPr lang="de-DE" sz="1400" dirty="0"/>
+              <a:t>Interrupt</a:t>
+            </a:r>
+          </a:p>
+        </p:txBody>
+      </p:sp>
+      <p:sp>
+        <p:nvSpPr>
+          <p:cNvPr id="33" name="Rechteck: abgerundete Ecken 32">
+            <a:extLst>
+              <a:ext uri="{FF2B5EF4-FFF2-40B4-BE49-F238E27FC236}">
+                <a16:creationId xmlns:a16="http://schemas.microsoft.com/office/drawing/2014/main" id="{939A035F-454B-4CB4-AB77-4484CA73A275}"/>
+              </a:ext>
+            </a:extLst>
+          </p:cNvPr>
+          <p:cNvSpPr/>
+          <p:nvPr/>
+        </p:nvSpPr>
+        <p:spPr>
+          <a:xfrm>
+            <a:off x="7831584" y="344867"/>
+            <a:ext cx="1540276" cy="498058"/>
+          </a:xfrm>
+          <a:prstGeom prst="roundRect">
+            <a:avLst/>
+          </a:prstGeom>
+          <a:solidFill>
+            <a:schemeClr val="bg1">
+              <a:lumMod val="50000"/>
+            </a:schemeClr>
+          </a:solidFill>
+          <a:ln>
+            <a:noFill/>
+          </a:ln>
+        </p:spPr>
+        <p:style>
+          <a:lnRef idx="2">
+            <a:schemeClr val="accent1">
+              <a:shade val="50000"/>
+            </a:schemeClr>
+          </a:lnRef>
+          <a:fillRef idx="1">
+            <a:schemeClr val="accent1"/>
+          </a:fillRef>
+          <a:effectRef idx="0">
+            <a:schemeClr val="accent1"/>
+          </a:effectRef>
+          <a:fontRef idx="minor">
+            <a:schemeClr val="lt1"/>
+          </a:fontRef>
+        </p:style>
+        <p:txBody>
+          <a:bodyPr rtlCol="0" anchor="ctr"/>
+          <a:lstStyle/>
+          <a:p>
+            <a:pPr algn="ctr"/>
+            <a:r>
+              <a:rPr lang="de-DE" dirty="0" err="1"/>
+              <a:t>Reedkontakt</a:t>
+            </a:r>
+            <a:endParaRPr lang="de-DE" dirty="0"/>
+          </a:p>
+        </p:txBody>
+      </p:sp>
+      <p:cxnSp>
+        <p:nvCxnSpPr>
+          <p:cNvPr id="35" name="Gerade Verbindung mit Pfeil 34">
+            <a:extLst>
+              <a:ext uri="{FF2B5EF4-FFF2-40B4-BE49-F238E27FC236}">
+                <a16:creationId xmlns:a16="http://schemas.microsoft.com/office/drawing/2014/main" id="{CB3F0452-6133-4ED9-B564-FBC8D2EB7A0E}"/>
+              </a:ext>
+            </a:extLst>
+          </p:cNvPr>
+          <p:cNvCxnSpPr>
+            <a:stCxn id="33" idx="2"/>
+            <a:endCxn id="9" idx="0"/>
+          </p:cNvCxnSpPr>
+          <p:nvPr/>
+        </p:nvCxnSpPr>
+        <p:spPr>
+          <a:xfrm>
+            <a:off x="8601722" y="842925"/>
+            <a:ext cx="0" cy="608575"/>
+          </a:xfrm>
+          <a:prstGeom prst="straightConnector1">
+            <a:avLst/>
+          </a:prstGeom>
+          <a:ln>
+            <a:tailEnd type="triangle"/>
+          </a:ln>
+        </p:spPr>
+        <p:style>
+          <a:lnRef idx="1">
+            <a:schemeClr val="accent1"/>
+          </a:lnRef>
+          <a:fillRef idx="0">
+            <a:schemeClr val="accent1"/>
+          </a:fillRef>
+          <a:effectRef idx="0">
+            <a:schemeClr val="accent1"/>
+          </a:effectRef>
+          <a:fontRef idx="minor">
+            <a:schemeClr val="tx1"/>
+          </a:fontRef>
+        </p:style>
+      </p:cxnSp>
+      <p:sp>
+        <p:nvSpPr>
+          <p:cNvPr id="37" name="Textfeld 36">
+            <a:extLst>
+              <a:ext uri="{FF2B5EF4-FFF2-40B4-BE49-F238E27FC236}">
+                <a16:creationId xmlns:a16="http://schemas.microsoft.com/office/drawing/2014/main" id="{2E0DF228-2247-465C-8FE5-C4C643C27DF7}"/>
+              </a:ext>
+            </a:extLst>
+          </p:cNvPr>
+          <p:cNvSpPr txBox="1"/>
+          <p:nvPr/>
+        </p:nvSpPr>
+        <p:spPr>
+          <a:xfrm>
+            <a:off x="8708254" y="1008712"/>
+            <a:ext cx="325730" cy="276999"/>
+          </a:xfrm>
+          <a:prstGeom prst="rect">
+            <a:avLst/>
+          </a:prstGeom>
+          <a:noFill/>
+        </p:spPr>
+        <p:txBody>
+          <a:bodyPr wrap="none" rtlCol="0">
+            <a:spAutoFit/>
+          </a:bodyPr>
+          <a:lstStyle/>
+          <a:p>
+            <a:r>
+              <a:rPr lang="de-DE" sz="1200" dirty="0"/>
+              <a:t>IO</a:t>
+            </a:r>
+          </a:p>
+        </p:txBody>
+      </p:sp>
+      <p:sp>
+        <p:nvSpPr>
+          <p:cNvPr id="2" name="Rechteck 1">
+            <a:extLst>
+              <a:ext uri="{FF2B5EF4-FFF2-40B4-BE49-F238E27FC236}">
+                <a16:creationId xmlns:a16="http://schemas.microsoft.com/office/drawing/2014/main" id="{C22DA254-1A98-2344-BC98-2E529F0BD142}"/>
+              </a:ext>
+            </a:extLst>
+          </p:cNvPr>
+          <p:cNvSpPr/>
+          <p:nvPr/>
+        </p:nvSpPr>
+        <p:spPr>
+          <a:xfrm>
+            <a:off x="6416707" y="234892"/>
+            <a:ext cx="5328409" cy="4580389"/>
+          </a:xfrm>
+          <a:prstGeom prst="rect">
+            <a:avLst/>
+          </a:prstGeom>
+          <a:noFill/>
+          <a:ln w="19050">
+            <a:solidFill>
+              <a:schemeClr val="tx1"/>
+            </a:solidFill>
+            <a:prstDash val="dash"/>
+          </a:ln>
+        </p:spPr>
+        <p:style>
+          <a:lnRef idx="2">
+            <a:schemeClr val="accent1">
+              <a:shade val="50000"/>
+            </a:schemeClr>
+          </a:lnRef>
+          <a:fillRef idx="1">
+            <a:schemeClr val="accent1"/>
+          </a:fillRef>
+          <a:effectRef idx="0">
+            <a:schemeClr val="accent1"/>
+          </a:effectRef>
+          <a:fontRef idx="minor">
+            <a:schemeClr val="lt1"/>
+          </a:fontRef>
+        </p:style>
+        <p:txBody>
+          <a:bodyPr rtlCol="0" anchor="ctr"/>
+          <a:lstStyle/>
+          <a:p>
+            <a:pPr algn="ctr"/>
+            <a:endParaRPr lang="de-DE"/>
+          </a:p>
+        </p:txBody>
+      </p:sp>
+      <p:sp>
+        <p:nvSpPr>
+          <p:cNvPr id="13" name="Pfeil: nach links und rechts 12">
+            <a:extLst>
+              <a:ext uri="{FF2B5EF4-FFF2-40B4-BE49-F238E27FC236}">
+                <a16:creationId xmlns:a16="http://schemas.microsoft.com/office/drawing/2014/main" id="{50AB7B7E-649B-4D77-9F7A-E4AFCCD1DB82}"/>
+              </a:ext>
+            </a:extLst>
+          </p:cNvPr>
+          <p:cNvSpPr/>
+          <p:nvPr/>
+        </p:nvSpPr>
+        <p:spPr>
+          <a:xfrm>
+            <a:off x="5775294" y="1451500"/>
             <a:ext cx="1346445" cy="643632"/>
           </a:xfrm>
           <a:prstGeom prst="leftRightArrow">
@@ -3804,6 +4354,9 @@
           <a:solidFill>
             <a:srgbClr val="C00000"/>
           </a:solidFill>
+          <a:ln>
+            <a:noFill/>
+          </a:ln>
         </p:spPr>
         <p:style>
           <a:lnRef idx="2">
@@ -3835,27 +4388,227 @@
       </p:sp>
       <p:sp>
         <p:nvSpPr>
-          <p:cNvPr id="14" name="Rechteck: abgerundete Ecken 13">
-            <a:extLst>
-              <a:ext uri="{FF2B5EF4-FFF2-40B4-BE49-F238E27FC236}">
-                <a16:creationId xmlns:a16="http://schemas.microsoft.com/office/drawing/2014/main" id="{EC5501FC-D75A-44B3-9F9C-AD1933593C99}"/>
-              </a:ext>
-            </a:extLst>
-          </p:cNvPr>
-          <p:cNvSpPr/>
+          <p:cNvPr id="3" name="Textfeld 2">
+            <a:extLst>
+              <a:ext uri="{FF2B5EF4-FFF2-40B4-BE49-F238E27FC236}">
+                <a16:creationId xmlns:a16="http://schemas.microsoft.com/office/drawing/2014/main" id="{B27008B4-E9B6-234D-AB5F-0EAF572B29CA}"/>
+              </a:ext>
+            </a:extLst>
+          </p:cNvPr>
+          <p:cNvSpPr txBox="1"/>
           <p:nvPr/>
         </p:nvSpPr>
         <p:spPr>
           <a:xfrm>
-            <a:off x="9210211" y="3462291"/>
-            <a:ext cx="1863201" cy="719092"/>
-          </a:xfrm>
-          <a:prstGeom prst="roundRect">
+            <a:off x="8194847" y="4447459"/>
+            <a:ext cx="1199367" cy="369332"/>
+          </a:xfrm>
+          <a:prstGeom prst="rect">
+            <a:avLst/>
+          </a:prstGeom>
+          <a:noFill/>
+        </p:spPr>
+        <p:txBody>
+          <a:bodyPr wrap="none" rtlCol="0">
+            <a:spAutoFit/>
+          </a:bodyPr>
+          <a:lstStyle/>
+          <a:p>
+            <a:r>
+              <a:rPr lang="de-DE" dirty="0"/>
+              <a:t>Hochbahn </a:t>
+            </a:r>
+          </a:p>
+        </p:txBody>
+      </p:sp>
+    </p:spTree>
+    <p:extLst>
+      <p:ext uri="{BB962C8B-B14F-4D97-AF65-F5344CB8AC3E}">
+        <p14:creationId xmlns:p14="http://schemas.microsoft.com/office/powerpoint/2010/main" val="764792871"/>
+      </p:ext>
+    </p:extLst>
+  </p:cSld>
+  <p:clrMapOvr>
+    <a:masterClrMapping/>
+  </p:clrMapOvr>
+</p:sld>
+</file>
+
+<file path=ppt/slides/slide2.xml><?xml version="1.0" encoding="utf-8"?>
+<p:sld xmlns:a="http://schemas.openxmlformats.org/drawingml/2006/main" xmlns:r="http://schemas.openxmlformats.org/officeDocument/2006/relationships" xmlns:p="http://schemas.openxmlformats.org/presentationml/2006/main">
+  <p:cSld>
+    <p:spTree>
+      <p:nvGrpSpPr>
+        <p:cNvPr id="1" name=""/>
+        <p:cNvGrpSpPr/>
+        <p:nvPr/>
+      </p:nvGrpSpPr>
+      <p:grpSpPr>
+        <a:xfrm>
+          <a:off x="0" y="0"/>
+          <a:ext cx="0" cy="0"/>
+          <a:chOff x="0" y="0"/>
+          <a:chExt cx="0" cy="0"/>
+        </a:xfrm>
+      </p:grpSpPr>
+      <p:sp>
+        <p:nvSpPr>
+          <p:cNvPr id="25" name="Textfeld 24">
+            <a:extLst>
+              <a:ext uri="{FF2B5EF4-FFF2-40B4-BE49-F238E27FC236}">
+                <a16:creationId xmlns:a16="http://schemas.microsoft.com/office/drawing/2014/main" id="{3DB9A31A-4177-1348-A49E-40CE8E6C27E4}"/>
+              </a:ext>
+            </a:extLst>
+          </p:cNvPr>
+          <p:cNvSpPr txBox="1"/>
+          <p:nvPr/>
+        </p:nvSpPr>
+        <p:spPr>
+          <a:xfrm>
+            <a:off x="916008" y="628938"/>
+            <a:ext cx="1939955" cy="461665"/>
+          </a:xfrm>
+          <a:prstGeom prst="rect">
             <a:avLst/>
           </a:prstGeom>
           <a:solidFill>
-            <a:srgbClr val="FFC000"/>
+            <a:schemeClr val="accent6">
+              <a:lumMod val="60000"/>
+              <a:lumOff val="40000"/>
+            </a:schemeClr>
           </a:solidFill>
+        </p:spPr>
+        <p:txBody>
+          <a:bodyPr wrap="none" rtlCol="0">
+            <a:spAutoFit/>
+          </a:bodyPr>
+          <a:lstStyle/>
+          <a:p>
+            <a:r>
+              <a:rPr lang="de-DE" sz="2400" b="1" dirty="0">
+                <a:latin typeface="Calibri" panose="020F0502020204030204" pitchFamily="34" charset="0"/>
+                <a:cs typeface="Calibri" panose="020F0502020204030204" pitchFamily="34" charset="0"/>
+              </a:rPr>
+              <a:t>Bedienebene </a:t>
+            </a:r>
+          </a:p>
+        </p:txBody>
+      </p:sp>
+      <p:sp>
+        <p:nvSpPr>
+          <p:cNvPr id="26" name="Textfeld 25">
+            <a:extLst>
+              <a:ext uri="{FF2B5EF4-FFF2-40B4-BE49-F238E27FC236}">
+                <a16:creationId xmlns:a16="http://schemas.microsoft.com/office/drawing/2014/main" id="{509C2749-14E7-9446-850E-8693B4CAD4B3}"/>
+              </a:ext>
+            </a:extLst>
+          </p:cNvPr>
+          <p:cNvSpPr txBox="1"/>
+          <p:nvPr/>
+        </p:nvSpPr>
+        <p:spPr>
+          <a:xfrm>
+            <a:off x="942743" y="4238732"/>
+            <a:ext cx="2484398" cy="461665"/>
+          </a:xfrm>
+          <a:prstGeom prst="rect">
+            <a:avLst/>
+          </a:prstGeom>
+          <a:solidFill>
+            <a:schemeClr val="accent4">
+              <a:lumMod val="60000"/>
+              <a:lumOff val="40000"/>
+            </a:schemeClr>
+          </a:solidFill>
+        </p:spPr>
+        <p:txBody>
+          <a:bodyPr wrap="none" rtlCol="0">
+            <a:spAutoFit/>
+          </a:bodyPr>
+          <a:lstStyle/>
+          <a:p>
+            <a:r>
+              <a:rPr lang="de-DE" sz="2400" b="1" dirty="0">
+                <a:latin typeface="Calibri" panose="020F0502020204030204" pitchFamily="34" charset="0"/>
+                <a:cs typeface="Calibri" panose="020F0502020204030204" pitchFamily="34" charset="0"/>
+              </a:rPr>
+              <a:t>Steuerungsebene </a:t>
+            </a:r>
+          </a:p>
+        </p:txBody>
+      </p:sp>
+      <p:sp>
+        <p:nvSpPr>
+          <p:cNvPr id="27" name="Textfeld 26">
+            <a:extLst>
+              <a:ext uri="{FF2B5EF4-FFF2-40B4-BE49-F238E27FC236}">
+                <a16:creationId xmlns:a16="http://schemas.microsoft.com/office/drawing/2014/main" id="{D0EBD6B8-583C-9B4C-A11B-1E0C139AD800}"/>
+              </a:ext>
+            </a:extLst>
+          </p:cNvPr>
+          <p:cNvSpPr txBox="1"/>
+          <p:nvPr/>
+        </p:nvSpPr>
+        <p:spPr>
+          <a:xfrm>
+            <a:off x="970672" y="5658194"/>
+            <a:ext cx="1513876" cy="461665"/>
+          </a:xfrm>
+          <a:prstGeom prst="rect">
+            <a:avLst/>
+          </a:prstGeom>
+          <a:solidFill>
+            <a:schemeClr val="accent3">
+              <a:lumMod val="60000"/>
+              <a:lumOff val="40000"/>
+            </a:schemeClr>
+          </a:solidFill>
+        </p:spPr>
+        <p:txBody>
+          <a:bodyPr wrap="none" rtlCol="0">
+            <a:spAutoFit/>
+          </a:bodyPr>
+          <a:lstStyle/>
+          <a:p>
+            <a:r>
+              <a:rPr lang="de-DE" sz="2400" b="1" dirty="0">
+                <a:latin typeface="Calibri" panose="020F0502020204030204" pitchFamily="34" charset="0"/>
+                <a:cs typeface="Calibri" panose="020F0502020204030204" pitchFamily="34" charset="0"/>
+              </a:rPr>
+              <a:t>Feldebene</a:t>
+            </a:r>
+          </a:p>
+        </p:txBody>
+      </p:sp>
+      <p:cxnSp>
+        <p:nvCxnSpPr>
+          <p:cNvPr id="29" name="Gerade Verbindung 28">
+            <a:extLst>
+              <a:ext uri="{FF2B5EF4-FFF2-40B4-BE49-F238E27FC236}">
+                <a16:creationId xmlns:a16="http://schemas.microsoft.com/office/drawing/2014/main" id="{D11DC96E-988E-1D4A-BD61-B116BD208582}"/>
+              </a:ext>
+            </a:extLst>
+          </p:cNvPr>
+          <p:cNvCxnSpPr/>
+          <p:nvPr/>
+        </p:nvCxnSpPr>
+        <p:spPr>
+          <a:xfrm>
+            <a:off x="805317" y="2053407"/>
+            <a:ext cx="9831897" cy="0"/>
+          </a:xfrm>
+          <a:prstGeom prst="line">
+            <a:avLst/>
+          </a:prstGeom>
+          <a:noFill/>
+          <a:ln w="12700">
+            <a:solidFill>
+              <a:schemeClr val="bg1">
+                <a:lumMod val="65000"/>
+              </a:schemeClr>
+            </a:solidFill>
+            <a:prstDash val="dash"/>
+          </a:ln>
         </p:spPr>
         <p:style>
           <a:lnRef idx="2">
@@ -3873,41 +4626,36 @@
             <a:schemeClr val="lt1"/>
           </a:fontRef>
         </p:style>
-        <p:txBody>
-          <a:bodyPr rtlCol="0" anchor="ctr"/>
-          <a:lstStyle/>
-          <a:p>
-            <a:pPr algn="ctr"/>
-            <a:r>
-              <a:rPr lang="de-DE" dirty="0"/>
-              <a:t>Arduino Distanzmessung</a:t>
-            </a:r>
-          </a:p>
-        </p:txBody>
-      </p:sp>
-      <p:sp>
-        <p:nvSpPr>
-          <p:cNvPr id="15" name="Rechteck: abgerundete Ecken 14">
-            <a:extLst>
-              <a:ext uri="{FF2B5EF4-FFF2-40B4-BE49-F238E27FC236}">
-                <a16:creationId xmlns:a16="http://schemas.microsoft.com/office/drawing/2014/main" id="{31F0726B-78D7-44E7-9FC0-554BE2B609A7}"/>
-              </a:ext>
-            </a:extLst>
-          </p:cNvPr>
-          <p:cNvSpPr/>
+      </p:cxnSp>
+      <p:cxnSp>
+        <p:nvCxnSpPr>
+          <p:cNvPr id="30" name="Gerade Verbindung 29">
+            <a:extLst>
+              <a:ext uri="{FF2B5EF4-FFF2-40B4-BE49-F238E27FC236}">
+                <a16:creationId xmlns:a16="http://schemas.microsoft.com/office/drawing/2014/main" id="{CC97E2E0-9A2D-9144-BF78-71E27CEC5051}"/>
+              </a:ext>
+            </a:extLst>
+          </p:cNvPr>
+          <p:cNvCxnSpPr/>
           <p:nvPr/>
-        </p:nvSpPr>
-        <p:spPr>
-          <a:xfrm>
-            <a:off x="7401758" y="3462291"/>
-            <a:ext cx="1306496" cy="719092"/>
-          </a:xfrm>
-          <a:prstGeom prst="roundRect">
+        </p:nvCxnSpPr>
+        <p:spPr>
+          <a:xfrm>
+            <a:off x="970672" y="5192280"/>
+            <a:ext cx="9831897" cy="0"/>
+          </a:xfrm>
+          <a:prstGeom prst="line">
             <a:avLst/>
           </a:prstGeom>
-          <a:solidFill>
-            <a:srgbClr val="FFC000"/>
-          </a:solidFill>
+          <a:noFill/>
+          <a:ln w="12700">
+            <a:solidFill>
+              <a:schemeClr val="bg1">
+                <a:lumMod val="65000"/>
+              </a:schemeClr>
+            </a:solidFill>
+            <a:prstDash val="dash"/>
+          </a:ln>
         </p:spPr>
         <p:style>
           <a:lnRef idx="2">
@@ -3925,43 +4673,701 @@
             <a:schemeClr val="lt1"/>
           </a:fontRef>
         </p:style>
-        <p:txBody>
-          <a:bodyPr rtlCol="0" anchor="ctr"/>
-          <a:lstStyle/>
-          <a:p>
-            <a:pPr algn="ctr"/>
-            <a:r>
-              <a:rPr lang="de-DE" dirty="0"/>
-              <a:t>Arduino Motor</a:t>
+      </p:cxnSp>
+      <p:sp>
+        <p:nvSpPr>
+          <p:cNvPr id="54" name="Textfeld 53">
+            <a:extLst>
+              <a:ext uri="{FF2B5EF4-FFF2-40B4-BE49-F238E27FC236}">
+                <a16:creationId xmlns:a16="http://schemas.microsoft.com/office/drawing/2014/main" id="{99DA029E-96A4-0743-BBBB-62FA943620F1}"/>
+              </a:ext>
+            </a:extLst>
+          </p:cNvPr>
+          <p:cNvSpPr txBox="1"/>
+          <p:nvPr/>
+        </p:nvSpPr>
+        <p:spPr>
+          <a:xfrm>
+            <a:off x="4807081" y="292063"/>
+            <a:ext cx="2226174" cy="442674"/>
+          </a:xfrm>
+          <a:prstGeom prst="roundRect">
+            <a:avLst/>
+          </a:prstGeom>
+          <a:solidFill>
+            <a:schemeClr val="accent6">
+              <a:lumMod val="40000"/>
+              <a:lumOff val="60000"/>
+            </a:schemeClr>
+          </a:solidFill>
+        </p:spPr>
+        <p:txBody>
+          <a:bodyPr wrap="none" rtlCol="0">
+            <a:spAutoFit/>
+          </a:bodyPr>
+          <a:lstStyle/>
+          <a:p>
+            <a:r>
+              <a:rPr lang="de-DE" sz="2000" dirty="0"/>
+              <a:t>Endgeräte (Handy) </a:t>
+            </a:r>
+          </a:p>
+        </p:txBody>
+      </p:sp>
+      <p:sp>
+        <p:nvSpPr>
+          <p:cNvPr id="55" name="Textfeld 54">
+            <a:extLst>
+              <a:ext uri="{FF2B5EF4-FFF2-40B4-BE49-F238E27FC236}">
+                <a16:creationId xmlns:a16="http://schemas.microsoft.com/office/drawing/2014/main" id="{384258B6-F4E8-F640-BBA6-D5244FC14A56}"/>
+              </a:ext>
+            </a:extLst>
+          </p:cNvPr>
+          <p:cNvSpPr txBox="1"/>
+          <p:nvPr/>
+        </p:nvSpPr>
+        <p:spPr>
+          <a:xfrm>
+            <a:off x="7049917" y="292063"/>
+            <a:ext cx="2192906" cy="442674"/>
+          </a:xfrm>
+          <a:prstGeom prst="roundRect">
+            <a:avLst/>
+          </a:prstGeom>
+          <a:solidFill>
+            <a:schemeClr val="accent6">
+              <a:lumMod val="40000"/>
+              <a:lumOff val="60000"/>
+            </a:schemeClr>
+          </a:solidFill>
+        </p:spPr>
+        <p:txBody>
+          <a:bodyPr wrap="none" rtlCol="0">
+            <a:spAutoFit/>
+          </a:bodyPr>
+          <a:lstStyle/>
+          <a:p>
+            <a:r>
+              <a:rPr lang="de-DE" sz="2000" dirty="0"/>
+              <a:t>Endgeräte (Tablet) </a:t>
             </a:r>
           </a:p>
         </p:txBody>
       </p:sp>
       <p:cxnSp>
         <p:nvCxnSpPr>
-          <p:cNvPr id="17" name="Verbinder: gewinkelt 16">
-            <a:extLst>
-              <a:ext uri="{FF2B5EF4-FFF2-40B4-BE49-F238E27FC236}">
-                <a16:creationId xmlns:a16="http://schemas.microsoft.com/office/drawing/2014/main" id="{1FAEFBB1-B164-4CD1-8BC2-3CF82AFDC495}"/>
+          <p:cNvPr id="56" name="Gerade Verbindung 55">
+            <a:extLst>
+              <a:ext uri="{FF2B5EF4-FFF2-40B4-BE49-F238E27FC236}">
+                <a16:creationId xmlns:a16="http://schemas.microsoft.com/office/drawing/2014/main" id="{305B7DBA-1119-A64F-9D00-97095F0776D0}"/>
+              </a:ext>
+            </a:extLst>
+          </p:cNvPr>
+          <p:cNvCxnSpPr/>
+          <p:nvPr/>
+        </p:nvCxnSpPr>
+        <p:spPr>
+          <a:xfrm>
+            <a:off x="942743" y="3261486"/>
+            <a:ext cx="9831897" cy="0"/>
+          </a:xfrm>
+          <a:prstGeom prst="line">
+            <a:avLst/>
+          </a:prstGeom>
+          <a:noFill/>
+          <a:ln w="12700">
+            <a:solidFill>
+              <a:schemeClr val="bg1">
+                <a:lumMod val="65000"/>
+              </a:schemeClr>
+            </a:solidFill>
+            <a:prstDash val="dash"/>
+          </a:ln>
+        </p:spPr>
+        <p:style>
+          <a:lnRef idx="2">
+            <a:schemeClr val="accent1">
+              <a:shade val="50000"/>
+            </a:schemeClr>
+          </a:lnRef>
+          <a:fillRef idx="1">
+            <a:schemeClr val="accent1"/>
+          </a:fillRef>
+          <a:effectRef idx="0">
+            <a:schemeClr val="accent1"/>
+          </a:effectRef>
+          <a:fontRef idx="minor">
+            <a:schemeClr val="lt1"/>
+          </a:fontRef>
+        </p:style>
+      </p:cxnSp>
+      <p:sp>
+        <p:nvSpPr>
+          <p:cNvPr id="57" name="Textfeld 56">
+            <a:extLst>
+              <a:ext uri="{FF2B5EF4-FFF2-40B4-BE49-F238E27FC236}">
+                <a16:creationId xmlns:a16="http://schemas.microsoft.com/office/drawing/2014/main" id="{55459A81-EE60-3441-AA10-9404244E62AC}"/>
+              </a:ext>
+            </a:extLst>
+          </p:cNvPr>
+          <p:cNvSpPr txBox="1"/>
+          <p:nvPr/>
+        </p:nvSpPr>
+        <p:spPr>
+          <a:xfrm>
+            <a:off x="849640" y="2420404"/>
+            <a:ext cx="3213957" cy="461665"/>
+          </a:xfrm>
+          <a:prstGeom prst="rect">
+            <a:avLst/>
+          </a:prstGeom>
+          <a:solidFill>
+            <a:schemeClr val="accent5">
+              <a:lumMod val="60000"/>
+              <a:lumOff val="40000"/>
+            </a:schemeClr>
+          </a:solidFill>
+        </p:spPr>
+        <p:txBody>
+          <a:bodyPr wrap="none" rtlCol="0">
+            <a:spAutoFit/>
+          </a:bodyPr>
+          <a:lstStyle/>
+          <a:p>
+            <a:r>
+              <a:rPr lang="de-DE" sz="2400" b="1" dirty="0">
+                <a:latin typeface="Calibri" panose="020F0502020204030204" pitchFamily="34" charset="0"/>
+                <a:cs typeface="Calibri" panose="020F0502020204030204" pitchFamily="34" charset="0"/>
+              </a:rPr>
+              <a:t>Kommunikationsebene </a:t>
+            </a:r>
+          </a:p>
+        </p:txBody>
+      </p:sp>
+      <p:sp>
+        <p:nvSpPr>
+          <p:cNvPr id="58" name="Textfeld 57">
+            <a:extLst>
+              <a:ext uri="{FF2B5EF4-FFF2-40B4-BE49-F238E27FC236}">
+                <a16:creationId xmlns:a16="http://schemas.microsoft.com/office/drawing/2014/main" id="{5FE14715-27C1-0B49-BD88-1ABC3F3FD516}"/>
+              </a:ext>
+            </a:extLst>
+          </p:cNvPr>
+          <p:cNvSpPr txBox="1"/>
+          <p:nvPr/>
+        </p:nvSpPr>
+        <p:spPr>
+          <a:xfrm>
+            <a:off x="5644715" y="3501912"/>
+            <a:ext cx="2623857" cy="442674"/>
+          </a:xfrm>
+          <a:prstGeom prst="roundRect">
+            <a:avLst/>
+          </a:prstGeom>
+          <a:solidFill>
+            <a:schemeClr val="accent4">
+              <a:lumMod val="40000"/>
+              <a:lumOff val="60000"/>
+            </a:schemeClr>
+          </a:solidFill>
+        </p:spPr>
+        <p:txBody>
+          <a:bodyPr wrap="none" rtlCol="0">
+            <a:spAutoFit/>
+          </a:bodyPr>
+          <a:lstStyle/>
+          <a:p>
+            <a:r>
+              <a:rPr lang="de-DE" sz="2000" dirty="0"/>
+              <a:t>Hochbahn – Controller </a:t>
+            </a:r>
+          </a:p>
+        </p:txBody>
+      </p:sp>
+      <p:sp>
+        <p:nvSpPr>
+          <p:cNvPr id="59" name="Textfeld 58">
+            <a:extLst>
+              <a:ext uri="{FF2B5EF4-FFF2-40B4-BE49-F238E27FC236}">
+                <a16:creationId xmlns:a16="http://schemas.microsoft.com/office/drawing/2014/main" id="{320405EC-0BED-6B4D-BF8E-9131CF38D8B8}"/>
+              </a:ext>
+            </a:extLst>
+          </p:cNvPr>
+          <p:cNvSpPr txBox="1"/>
+          <p:nvPr/>
+        </p:nvSpPr>
+        <p:spPr>
+          <a:xfrm>
+            <a:off x="4105124" y="4562659"/>
+            <a:ext cx="1990876" cy="442674"/>
+          </a:xfrm>
+          <a:prstGeom prst="roundRect">
+            <a:avLst/>
+          </a:prstGeom>
+          <a:solidFill>
+            <a:schemeClr val="accent4">
+              <a:lumMod val="40000"/>
+              <a:lumOff val="60000"/>
+            </a:schemeClr>
+          </a:solidFill>
+        </p:spPr>
+        <p:txBody>
+          <a:bodyPr wrap="none" rtlCol="0">
+            <a:spAutoFit/>
+          </a:bodyPr>
+          <a:lstStyle/>
+          <a:p>
+            <a:r>
+              <a:rPr lang="de-DE" sz="2000" dirty="0"/>
+              <a:t>Motorsteuerung </a:t>
+            </a:r>
+          </a:p>
+        </p:txBody>
+      </p:sp>
+      <p:sp>
+        <p:nvSpPr>
+          <p:cNvPr id="60" name="Textfeld 59">
+            <a:extLst>
+              <a:ext uri="{FF2B5EF4-FFF2-40B4-BE49-F238E27FC236}">
+                <a16:creationId xmlns:a16="http://schemas.microsoft.com/office/drawing/2014/main" id="{8C1C9D20-B15C-BA4F-A9E9-93E94FA0A7D5}"/>
+              </a:ext>
+            </a:extLst>
+          </p:cNvPr>
+          <p:cNvSpPr txBox="1"/>
+          <p:nvPr/>
+        </p:nvSpPr>
+        <p:spPr>
+          <a:xfrm>
+            <a:off x="7551507" y="4534959"/>
+            <a:ext cx="2525970" cy="442674"/>
+          </a:xfrm>
+          <a:prstGeom prst="roundRect">
+            <a:avLst/>
+          </a:prstGeom>
+          <a:solidFill>
+            <a:schemeClr val="accent4">
+              <a:lumMod val="40000"/>
+              <a:lumOff val="60000"/>
+            </a:schemeClr>
+          </a:solidFill>
+        </p:spPr>
+        <p:txBody>
+          <a:bodyPr wrap="none" rtlCol="0">
+            <a:spAutoFit/>
+          </a:bodyPr>
+          <a:lstStyle/>
+          <a:p>
+            <a:pPr algn="ctr"/>
+            <a:r>
+              <a:rPr lang="de-DE" sz="2000" dirty="0"/>
+              <a:t>Sicherheitssteuerung  </a:t>
+            </a:r>
+          </a:p>
+        </p:txBody>
+      </p:sp>
+      <p:sp>
+        <p:nvSpPr>
+          <p:cNvPr id="61" name="Textfeld 60">
+            <a:extLst>
+              <a:ext uri="{FF2B5EF4-FFF2-40B4-BE49-F238E27FC236}">
+                <a16:creationId xmlns:a16="http://schemas.microsoft.com/office/drawing/2014/main" id="{94AFA486-7F55-3F49-9B0F-65C5797DC750}"/>
+              </a:ext>
+            </a:extLst>
+          </p:cNvPr>
+          <p:cNvSpPr txBox="1"/>
+          <p:nvPr/>
+        </p:nvSpPr>
+        <p:spPr>
+          <a:xfrm>
+            <a:off x="6156404" y="5677185"/>
+            <a:ext cx="1624663" cy="442674"/>
+          </a:xfrm>
+          <a:prstGeom prst="roundRect">
+            <a:avLst/>
+          </a:prstGeom>
+          <a:solidFill>
+            <a:schemeClr val="accent3">
+              <a:lumMod val="40000"/>
+              <a:lumOff val="60000"/>
+            </a:schemeClr>
+          </a:solidFill>
+        </p:spPr>
+        <p:txBody>
+          <a:bodyPr wrap="none" rtlCol="0">
+            <a:spAutoFit/>
+          </a:bodyPr>
+          <a:lstStyle/>
+          <a:p>
+            <a:r>
+              <a:rPr lang="de-DE" sz="2000" dirty="0"/>
+              <a:t>Reed-Kontakt</a:t>
+            </a:r>
+          </a:p>
+        </p:txBody>
+      </p:sp>
+      <p:sp>
+        <p:nvSpPr>
+          <p:cNvPr id="62" name="Textfeld 61">
+            <a:extLst>
+              <a:ext uri="{FF2B5EF4-FFF2-40B4-BE49-F238E27FC236}">
+                <a16:creationId xmlns:a16="http://schemas.microsoft.com/office/drawing/2014/main" id="{4FD19730-D561-1F44-AF43-7B89AD252471}"/>
+              </a:ext>
+            </a:extLst>
+          </p:cNvPr>
+          <p:cNvSpPr txBox="1"/>
+          <p:nvPr/>
+        </p:nvSpPr>
+        <p:spPr>
+          <a:xfrm>
+            <a:off x="4330304" y="5667689"/>
+            <a:ext cx="1438638" cy="442674"/>
+          </a:xfrm>
+          <a:prstGeom prst="roundRect">
+            <a:avLst/>
+          </a:prstGeom>
+          <a:solidFill>
+            <a:schemeClr val="accent3">
+              <a:lumMod val="40000"/>
+              <a:lumOff val="60000"/>
+            </a:schemeClr>
+          </a:solidFill>
+        </p:spPr>
+        <p:txBody>
+          <a:bodyPr wrap="none" rtlCol="0">
+            <a:spAutoFit/>
+          </a:bodyPr>
+          <a:lstStyle/>
+          <a:p>
+            <a:r>
+              <a:rPr lang="de-DE" sz="2000" dirty="0"/>
+              <a:t>M. - Treiber</a:t>
+            </a:r>
+          </a:p>
+        </p:txBody>
+      </p:sp>
+      <p:sp>
+        <p:nvSpPr>
+          <p:cNvPr id="63" name="Textfeld 62">
+            <a:extLst>
+              <a:ext uri="{FF2B5EF4-FFF2-40B4-BE49-F238E27FC236}">
+                <a16:creationId xmlns:a16="http://schemas.microsoft.com/office/drawing/2014/main" id="{F4A5739E-41C9-E34D-9446-8581721D094B}"/>
+              </a:ext>
+            </a:extLst>
+          </p:cNvPr>
+          <p:cNvSpPr txBox="1"/>
+          <p:nvPr/>
+        </p:nvSpPr>
+        <p:spPr>
+          <a:xfrm>
+            <a:off x="7942848" y="5677185"/>
+            <a:ext cx="2017871" cy="442674"/>
+          </a:xfrm>
+          <a:prstGeom prst="roundRect">
+            <a:avLst/>
+          </a:prstGeom>
+          <a:solidFill>
+            <a:schemeClr val="accent3">
+              <a:lumMod val="40000"/>
+              <a:lumOff val="60000"/>
+            </a:schemeClr>
+          </a:solidFill>
+        </p:spPr>
+        <p:txBody>
+          <a:bodyPr wrap="none" rtlCol="0">
+            <a:spAutoFit/>
+          </a:bodyPr>
+          <a:lstStyle/>
+          <a:p>
+            <a:r>
+              <a:rPr lang="de-DE" sz="2000" dirty="0"/>
+              <a:t>Ultraschallsensor</a:t>
+            </a:r>
+          </a:p>
+        </p:txBody>
+      </p:sp>
+      <p:sp>
+        <p:nvSpPr>
+          <p:cNvPr id="65" name="Textfeld 64">
+            <a:extLst>
+              <a:ext uri="{FF2B5EF4-FFF2-40B4-BE49-F238E27FC236}">
+                <a16:creationId xmlns:a16="http://schemas.microsoft.com/office/drawing/2014/main" id="{DD163F3F-A7CC-6B4C-A2B3-3D3AA3F5A4E5}"/>
+              </a:ext>
+            </a:extLst>
+          </p:cNvPr>
+          <p:cNvSpPr txBox="1"/>
+          <p:nvPr/>
+        </p:nvSpPr>
+        <p:spPr>
+          <a:xfrm>
+            <a:off x="6199287" y="1343424"/>
+            <a:ext cx="1514714" cy="442674"/>
+          </a:xfrm>
+          <a:prstGeom prst="roundRect">
+            <a:avLst/>
+          </a:prstGeom>
+          <a:solidFill>
+            <a:schemeClr val="accent6">
+              <a:lumMod val="40000"/>
+              <a:lumOff val="60000"/>
+            </a:schemeClr>
+          </a:solidFill>
+        </p:spPr>
+        <p:txBody>
+          <a:bodyPr wrap="none" rtlCol="0">
+            <a:spAutoFit/>
+          </a:bodyPr>
+          <a:lstStyle/>
+          <a:p>
+            <a:r>
+              <a:rPr lang="de-DE" sz="2000" dirty="0"/>
+              <a:t>Web-Server </a:t>
+            </a:r>
+          </a:p>
+        </p:txBody>
+      </p:sp>
+      <p:sp>
+        <p:nvSpPr>
+          <p:cNvPr id="66" name="Textfeld 65">
+            <a:extLst>
+              <a:ext uri="{FF2B5EF4-FFF2-40B4-BE49-F238E27FC236}">
+                <a16:creationId xmlns:a16="http://schemas.microsoft.com/office/drawing/2014/main" id="{9156939B-1B23-F046-B547-004C292E2E2C}"/>
+              </a:ext>
+            </a:extLst>
+          </p:cNvPr>
+          <p:cNvSpPr txBox="1"/>
+          <p:nvPr/>
+        </p:nvSpPr>
+        <p:spPr>
+          <a:xfrm>
+            <a:off x="6156404" y="2524508"/>
+            <a:ext cx="1600479" cy="442674"/>
+          </a:xfrm>
+          <a:prstGeom prst="roundRect">
+            <a:avLst/>
+          </a:prstGeom>
+          <a:solidFill>
+            <a:schemeClr val="accent5">
+              <a:lumMod val="40000"/>
+              <a:lumOff val="60000"/>
+            </a:schemeClr>
+          </a:solidFill>
+        </p:spPr>
+        <p:txBody>
+          <a:bodyPr wrap="none" rtlCol="0">
+            <a:spAutoFit/>
+          </a:bodyPr>
+          <a:lstStyle/>
+          <a:p>
+            <a:r>
+              <a:rPr lang="de-DE" sz="2000" dirty="0"/>
+              <a:t>MQTT-Broker</a:t>
+            </a:r>
+          </a:p>
+        </p:txBody>
+      </p:sp>
+      <p:cxnSp>
+        <p:nvCxnSpPr>
+          <p:cNvPr id="69" name="Gerade Verbindung mit Pfeil 68">
+            <a:extLst>
+              <a:ext uri="{FF2B5EF4-FFF2-40B4-BE49-F238E27FC236}">
+                <a16:creationId xmlns:a16="http://schemas.microsoft.com/office/drawing/2014/main" id="{015C6E28-F3FF-1F4E-A6B3-0A7563488856}"/>
               </a:ext>
             </a:extLst>
           </p:cNvPr>
           <p:cNvCxnSpPr>
-            <a:cxnSpLocks/>
-            <a:stCxn id="14" idx="0"/>
-            <a:endCxn id="9" idx="3"/>
+            <a:stCxn id="65" idx="2"/>
+            <a:endCxn id="66" idx="0"/>
           </p:cNvCxnSpPr>
           <p:nvPr/>
         </p:nvCxnSpPr>
         <p:spPr>
-          <a:xfrm rot="16200000" flipV="1">
-            <a:off x="8872769" y="2193248"/>
-            <a:ext cx="1651245" cy="886842"/>
-          </a:xfrm>
-          <a:prstGeom prst="bentConnector2">
+          <a:xfrm>
+            <a:off x="6956644" y="1786098"/>
+            <a:ext cx="0" cy="738410"/>
+          </a:xfrm>
+          <a:prstGeom prst="straightConnector1">
             <a:avLst/>
           </a:prstGeom>
-          <a:ln>
+          <a:ln w="57150">
+            <a:solidFill>
+              <a:schemeClr val="tx1">
+                <a:lumMod val="50000"/>
+                <a:lumOff val="50000"/>
+              </a:schemeClr>
+            </a:solidFill>
+            <a:headEnd type="triangle"/>
+            <a:tailEnd type="triangle"/>
+          </a:ln>
+        </p:spPr>
+        <p:style>
+          <a:lnRef idx="1">
+            <a:schemeClr val="accent1"/>
+          </a:lnRef>
+          <a:fillRef idx="0">
+            <a:schemeClr val="accent1"/>
+          </a:fillRef>
+          <a:effectRef idx="0">
+            <a:schemeClr val="accent1"/>
+          </a:effectRef>
+          <a:fontRef idx="minor">
+            <a:schemeClr val="tx1"/>
+          </a:fontRef>
+        </p:style>
+      </p:cxnSp>
+      <p:sp>
+        <p:nvSpPr>
+          <p:cNvPr id="70" name="Textfeld 69">
+            <a:extLst>
+              <a:ext uri="{FF2B5EF4-FFF2-40B4-BE49-F238E27FC236}">
+                <a16:creationId xmlns:a16="http://schemas.microsoft.com/office/drawing/2014/main" id="{9AAE259D-E2AD-524C-BEA8-1238AE5C3941}"/>
+              </a:ext>
+            </a:extLst>
+          </p:cNvPr>
+          <p:cNvSpPr txBox="1"/>
+          <p:nvPr/>
+        </p:nvSpPr>
+        <p:spPr>
+          <a:xfrm>
+            <a:off x="6977331" y="2053407"/>
+            <a:ext cx="759567" cy="369332"/>
+          </a:xfrm>
+          <a:prstGeom prst="rect">
+            <a:avLst/>
+          </a:prstGeom>
+          <a:noFill/>
+        </p:spPr>
+        <p:txBody>
+          <a:bodyPr wrap="none" rtlCol="0">
+            <a:spAutoFit/>
+          </a:bodyPr>
+          <a:lstStyle/>
+          <a:p>
+            <a:r>
+              <a:rPr lang="de-DE" i="1" dirty="0"/>
+              <a:t>MQTT</a:t>
+            </a:r>
+          </a:p>
+        </p:txBody>
+      </p:sp>
+      <p:cxnSp>
+        <p:nvCxnSpPr>
+          <p:cNvPr id="72" name="Gerade Verbindung mit Pfeil 71">
+            <a:extLst>
+              <a:ext uri="{FF2B5EF4-FFF2-40B4-BE49-F238E27FC236}">
+                <a16:creationId xmlns:a16="http://schemas.microsoft.com/office/drawing/2014/main" id="{B207F947-E84C-794F-B8B1-1DE8E12918DD}"/>
+              </a:ext>
+            </a:extLst>
+          </p:cNvPr>
+          <p:cNvCxnSpPr>
+            <a:cxnSpLocks/>
+            <a:stCxn id="66" idx="2"/>
+            <a:endCxn id="58" idx="0"/>
+          </p:cNvCxnSpPr>
+          <p:nvPr/>
+        </p:nvCxnSpPr>
+        <p:spPr>
+          <a:xfrm>
+            <a:off x="6956644" y="2967182"/>
+            <a:ext cx="0" cy="534730"/>
+          </a:xfrm>
+          <a:prstGeom prst="straightConnector1">
+            <a:avLst/>
+          </a:prstGeom>
+          <a:ln w="57150">
+            <a:solidFill>
+              <a:schemeClr val="tx1">
+                <a:lumMod val="50000"/>
+                <a:lumOff val="50000"/>
+              </a:schemeClr>
+            </a:solidFill>
+            <a:headEnd type="triangle"/>
+            <a:tailEnd type="triangle"/>
+          </a:ln>
+        </p:spPr>
+        <p:style>
+          <a:lnRef idx="1">
+            <a:schemeClr val="accent1"/>
+          </a:lnRef>
+          <a:fillRef idx="0">
+            <a:schemeClr val="accent1"/>
+          </a:fillRef>
+          <a:effectRef idx="0">
+            <a:schemeClr val="accent1"/>
+          </a:effectRef>
+          <a:fontRef idx="minor">
+            <a:schemeClr val="tx1"/>
+          </a:fontRef>
+        </p:style>
+      </p:cxnSp>
+      <p:sp>
+        <p:nvSpPr>
+          <p:cNvPr id="73" name="Textfeld 72">
+            <a:extLst>
+              <a:ext uri="{FF2B5EF4-FFF2-40B4-BE49-F238E27FC236}">
+                <a16:creationId xmlns:a16="http://schemas.microsoft.com/office/drawing/2014/main" id="{7B14710A-1551-D941-872C-0B71F72AC1B1}"/>
+              </a:ext>
+            </a:extLst>
+          </p:cNvPr>
+          <p:cNvSpPr txBox="1"/>
+          <p:nvPr/>
+        </p:nvSpPr>
+        <p:spPr>
+          <a:xfrm>
+            <a:off x="7049917" y="3041117"/>
+            <a:ext cx="759567" cy="369332"/>
+          </a:xfrm>
+          <a:prstGeom prst="rect">
+            <a:avLst/>
+          </a:prstGeom>
+          <a:solidFill>
+            <a:schemeClr val="bg1"/>
+          </a:solidFill>
+        </p:spPr>
+        <p:txBody>
+          <a:bodyPr wrap="none" rtlCol="0">
+            <a:spAutoFit/>
+          </a:bodyPr>
+          <a:lstStyle/>
+          <a:p>
+            <a:r>
+              <a:rPr lang="de-DE" i="1" dirty="0"/>
+              <a:t>MQTT</a:t>
+            </a:r>
+          </a:p>
+        </p:txBody>
+      </p:sp>
+      <p:cxnSp>
+        <p:nvCxnSpPr>
+          <p:cNvPr id="77" name="Gewinkelte Verbindung 76">
+            <a:extLst>
+              <a:ext uri="{FF2B5EF4-FFF2-40B4-BE49-F238E27FC236}">
+                <a16:creationId xmlns:a16="http://schemas.microsoft.com/office/drawing/2014/main" id="{46DABADF-3B32-4942-AC38-9F7A050CB16D}"/>
+              </a:ext>
+            </a:extLst>
+          </p:cNvPr>
+          <p:cNvCxnSpPr>
+            <a:cxnSpLocks/>
+            <a:stCxn id="54" idx="2"/>
+            <a:endCxn id="65" idx="0"/>
+          </p:cNvCxnSpPr>
+          <p:nvPr/>
+        </p:nvCxnSpPr>
+        <p:spPr>
+          <a:xfrm rot="16200000" flipH="1">
+            <a:off x="6134063" y="520842"/>
+            <a:ext cx="608687" cy="1036476"/>
+          </a:xfrm>
+          <a:prstGeom prst="bentConnector3">
+            <a:avLst/>
+          </a:prstGeom>
+          <a:ln w="57150">
+            <a:solidFill>
+              <a:schemeClr val="tx1">
+                <a:lumMod val="50000"/>
+                <a:lumOff val="50000"/>
+              </a:schemeClr>
+            </a:solidFill>
+            <a:headEnd type="triangle"/>
             <a:tailEnd type="triangle"/>
           </a:ln>
         </p:spPr>
@@ -3982,10 +5388,143 @@
       </p:cxnSp>
       <p:cxnSp>
         <p:nvCxnSpPr>
-          <p:cNvPr id="21" name="Verbinder: gewinkelt 20">
-            <a:extLst>
-              <a:ext uri="{FF2B5EF4-FFF2-40B4-BE49-F238E27FC236}">
-                <a16:creationId xmlns:a16="http://schemas.microsoft.com/office/drawing/2014/main" id="{8BBA6297-C575-4D73-9F70-0C092B4DB125}"/>
+          <p:cNvPr id="79" name="Gewinkelte Verbindung 78">
+            <a:extLst>
+              <a:ext uri="{FF2B5EF4-FFF2-40B4-BE49-F238E27FC236}">
+                <a16:creationId xmlns:a16="http://schemas.microsoft.com/office/drawing/2014/main" id="{951164B7-08E2-294F-953B-1FC12575F7E2}"/>
+              </a:ext>
+            </a:extLst>
+          </p:cNvPr>
+          <p:cNvCxnSpPr>
+            <a:cxnSpLocks/>
+            <a:stCxn id="55" idx="2"/>
+            <a:endCxn id="65" idx="0"/>
+          </p:cNvCxnSpPr>
+          <p:nvPr/>
+        </p:nvCxnSpPr>
+        <p:spPr>
+          <a:xfrm rot="5400000">
+            <a:off x="7247164" y="444217"/>
+            <a:ext cx="608687" cy="1189726"/>
+          </a:xfrm>
+          <a:prstGeom prst="bentConnector3">
+            <a:avLst>
+              <a:gd name="adj1" fmla="val 50000"/>
+            </a:avLst>
+          </a:prstGeom>
+          <a:ln w="57150">
+            <a:solidFill>
+              <a:schemeClr val="tx1">
+                <a:lumMod val="50000"/>
+                <a:lumOff val="50000"/>
+              </a:schemeClr>
+            </a:solidFill>
+            <a:headEnd type="triangle"/>
+            <a:tailEnd type="triangle"/>
+          </a:ln>
+        </p:spPr>
+        <p:style>
+          <a:lnRef idx="1">
+            <a:schemeClr val="accent1"/>
+          </a:lnRef>
+          <a:fillRef idx="0">
+            <a:schemeClr val="accent1"/>
+          </a:fillRef>
+          <a:effectRef idx="0">
+            <a:schemeClr val="accent1"/>
+          </a:effectRef>
+          <a:fontRef idx="minor">
+            <a:schemeClr val="tx1"/>
+          </a:fontRef>
+        </p:style>
+      </p:cxnSp>
+      <p:sp>
+        <p:nvSpPr>
+          <p:cNvPr id="82" name="Textfeld 81">
+            <a:extLst>
+              <a:ext uri="{FF2B5EF4-FFF2-40B4-BE49-F238E27FC236}">
+                <a16:creationId xmlns:a16="http://schemas.microsoft.com/office/drawing/2014/main" id="{9C788971-FBFA-2245-88FE-15C845407E0F}"/>
+              </a:ext>
+            </a:extLst>
+          </p:cNvPr>
+          <p:cNvSpPr txBox="1"/>
+          <p:nvPr/>
+        </p:nvSpPr>
+        <p:spPr>
+          <a:xfrm>
+            <a:off x="6660201" y="686949"/>
+            <a:ext cx="675249" cy="369332"/>
+          </a:xfrm>
+          <a:prstGeom prst="rect">
+            <a:avLst/>
+          </a:prstGeom>
+          <a:noFill/>
+        </p:spPr>
+        <p:txBody>
+          <a:bodyPr wrap="none" rtlCol="0">
+            <a:spAutoFit/>
+          </a:bodyPr>
+          <a:lstStyle/>
+          <a:p>
+            <a:r>
+              <a:rPr lang="de-DE" i="1" dirty="0"/>
+              <a:t>HTTP</a:t>
+            </a:r>
+          </a:p>
+        </p:txBody>
+      </p:sp>
+      <p:sp>
+        <p:nvSpPr>
+          <p:cNvPr id="89" name="Textfeld 88">
+            <a:extLst>
+              <a:ext uri="{FF2B5EF4-FFF2-40B4-BE49-F238E27FC236}">
+                <a16:creationId xmlns:a16="http://schemas.microsoft.com/office/drawing/2014/main" id="{FECBED2F-B16D-944A-8AEB-A0AC613E2BBA}"/>
+              </a:ext>
+            </a:extLst>
+          </p:cNvPr>
+          <p:cNvSpPr txBox="1"/>
+          <p:nvPr/>
+        </p:nvSpPr>
+        <p:spPr>
+          <a:xfrm>
+            <a:off x="4883710" y="4072820"/>
+            <a:ext cx="721801" cy="369332"/>
+          </a:xfrm>
+          <a:prstGeom prst="rect">
+            <a:avLst/>
+          </a:prstGeom>
+          <a:solidFill>
+            <a:schemeClr val="bg1"/>
+          </a:solidFill>
+        </p:spPr>
+        <p:txBody>
+          <a:bodyPr wrap="none" rtlCol="0">
+            <a:spAutoFit/>
+          </a:bodyPr>
+          <a:lstStyle/>
+          <a:p>
+            <a:r>
+              <a:rPr lang="de-DE" i="1" dirty="0" err="1"/>
+              <a:t>Rx</a:t>
+            </a:r>
+            <a:r>
+              <a:rPr lang="de-DE" i="1" dirty="0"/>
+              <a:t>, </a:t>
+            </a:r>
+            <a:r>
+              <a:rPr lang="de-DE" i="1" dirty="0" err="1"/>
+              <a:t>Tx</a:t>
+            </a:r>
+            <a:endParaRPr lang="de-DE" i="1" dirty="0"/>
+          </a:p>
+        </p:txBody>
+      </p:sp>
+      <p:cxnSp>
+        <p:nvCxnSpPr>
+          <p:cNvPr id="92" name="Gerade Verbindung mit Pfeil 91">
+            <a:extLst>
+              <a:ext uri="{FF2B5EF4-FFF2-40B4-BE49-F238E27FC236}">
+                <a16:creationId xmlns:a16="http://schemas.microsoft.com/office/drawing/2014/main" id="{91737112-3268-CF48-80C6-7B07F85029F2}"/>
               </a:ext>
             </a:extLst>
           </p:cNvPr>
@@ -3995,16 +5534,21 @@
           <p:nvPr/>
         </p:nvCxnSpPr>
         <p:spPr>
-          <a:xfrm rot="16200000" flipV="1">
-            <a:off x="8937595" y="1986378"/>
-            <a:ext cx="1793288" cy="1158538"/>
-          </a:xfrm>
-          <a:prstGeom prst="bentConnector3">
-            <a:avLst>
-              <a:gd name="adj1" fmla="val 100495"/>
-            </a:avLst>
+          <a:xfrm>
+            <a:off x="5785926" y="3983326"/>
+            <a:ext cx="0" cy="590881"/>
+          </a:xfrm>
+          <a:prstGeom prst="straightConnector1">
+            <a:avLst/>
           </a:prstGeom>
-          <a:ln>
+          <a:ln w="57150">
+            <a:solidFill>
+              <a:schemeClr val="tx1">
+                <a:lumMod val="50000"/>
+                <a:lumOff val="50000"/>
+              </a:schemeClr>
+            </a:solidFill>
+            <a:headEnd type="triangle"/>
             <a:tailEnd type="triangle"/>
           </a:ln>
         </p:spPr>
@@ -4025,25 +5569,33 @@
       </p:cxnSp>
       <p:cxnSp>
         <p:nvCxnSpPr>
-          <p:cNvPr id="30" name="Gerade Verbindung mit Pfeil 29">
-            <a:extLst>
-              <a:ext uri="{FF2B5EF4-FFF2-40B4-BE49-F238E27FC236}">
-                <a16:creationId xmlns:a16="http://schemas.microsoft.com/office/drawing/2014/main" id="{704CAE75-C62B-46A2-935E-3A57945F765A}"/>
-              </a:ext>
-            </a:extLst>
-          </p:cNvPr>
-          <p:cNvCxnSpPr/>
+          <p:cNvPr id="94" name="Gerade Verbindung mit Pfeil 93">
+            <a:extLst>
+              <a:ext uri="{FF2B5EF4-FFF2-40B4-BE49-F238E27FC236}">
+                <a16:creationId xmlns:a16="http://schemas.microsoft.com/office/drawing/2014/main" id="{C1336AEE-D6E8-DA4D-8F9E-A0169FBF0029}"/>
+              </a:ext>
+            </a:extLst>
+          </p:cNvPr>
+          <p:cNvCxnSpPr>
+            <a:cxnSpLocks/>
+          </p:cNvCxnSpPr>
           <p:nvPr/>
         </p:nvCxnSpPr>
         <p:spPr>
-          <a:xfrm flipV="1">
-            <a:off x="8266590" y="2170592"/>
-            <a:ext cx="0" cy="1291699"/>
+          <a:xfrm>
+            <a:off x="7883770" y="3950564"/>
+            <a:ext cx="0" cy="590881"/>
           </a:xfrm>
           <a:prstGeom prst="straightConnector1">
             <a:avLst/>
           </a:prstGeom>
-          <a:ln>
+          <a:ln w="57150">
+            <a:solidFill>
+              <a:schemeClr val="tx1">
+                <a:lumMod val="50000"/>
+                <a:lumOff val="50000"/>
+              </a:schemeClr>
+            </a:solidFill>
             <a:headEnd type="triangle"/>
             <a:tailEnd type="triangle"/>
           </a:ln>
@@ -4065,10 +5617,10 @@
       </p:cxnSp>
       <p:sp>
         <p:nvSpPr>
-          <p:cNvPr id="31" name="Textfeld 30">
-            <a:extLst>
-              <a:ext uri="{FF2B5EF4-FFF2-40B4-BE49-F238E27FC236}">
-                <a16:creationId xmlns:a16="http://schemas.microsoft.com/office/drawing/2014/main" id="{C64E396E-CE93-4CDD-B4DC-A72DA0C6FFB7}"/>
+          <p:cNvPr id="95" name="Textfeld 94">
+            <a:extLst>
+              <a:ext uri="{FF2B5EF4-FFF2-40B4-BE49-F238E27FC236}">
+                <a16:creationId xmlns:a16="http://schemas.microsoft.com/office/drawing/2014/main" id="{78AF1480-2108-8245-BC2A-91AC49F15B17}"/>
               </a:ext>
             </a:extLst>
           </p:cNvPr>
@@ -4077,13 +5629,15 @@
         </p:nvSpPr>
         <p:spPr>
           <a:xfrm>
-            <a:off x="7639606" y="2657980"/>
-            <a:ext cx="577402" cy="276999"/>
+            <a:off x="8092822" y="4073197"/>
+            <a:ext cx="1375633" cy="369332"/>
           </a:xfrm>
           <a:prstGeom prst="rect">
             <a:avLst/>
           </a:prstGeom>
-          <a:noFill/>
+          <a:solidFill>
+            <a:schemeClr val="bg1"/>
+          </a:solidFill>
         </p:spPr>
         <p:txBody>
           <a:bodyPr wrap="none" rtlCol="0">
@@ -4092,144 +5646,44 @@
           <a:lstStyle/>
           <a:p>
             <a:r>
-              <a:rPr lang="de-DE" sz="1200" dirty="0"/>
-              <a:t>RX, TX</a:t>
-            </a:r>
-          </a:p>
-        </p:txBody>
-      </p:sp>
-      <p:sp>
-        <p:nvSpPr>
-          <p:cNvPr id="32" name="Textfeld 31">
-            <a:extLst>
-              <a:ext uri="{FF2B5EF4-FFF2-40B4-BE49-F238E27FC236}">
-                <a16:creationId xmlns:a16="http://schemas.microsoft.com/office/drawing/2014/main" id="{A58F5900-1551-49AD-B770-0D7718724D37}"/>
-              </a:ext>
-            </a:extLst>
-          </p:cNvPr>
-          <p:cNvSpPr txBox="1"/>
-          <p:nvPr/>
-        </p:nvSpPr>
-        <p:spPr>
-          <a:xfrm>
-            <a:off x="10387788" y="2196315"/>
-            <a:ext cx="1804212" cy="738664"/>
-          </a:xfrm>
-          <a:prstGeom prst="rect">
-            <a:avLst/>
-          </a:prstGeom>
-          <a:noFill/>
-        </p:spPr>
-        <p:txBody>
-          <a:bodyPr wrap="none" rtlCol="0">
-            <a:spAutoFit/>
-          </a:bodyPr>
-          <a:lstStyle/>
-          <a:p>
-            <a:r>
-              <a:rPr lang="de-DE" sz="1400" dirty="0"/>
-              <a:t>2 Pins </a:t>
-            </a:r>
-          </a:p>
-          <a:p>
-            <a:r>
-              <a:rPr lang="de-DE" sz="1400" dirty="0"/>
-              <a:t>(</a:t>
-            </a:r>
-            <a:r>
-              <a:rPr lang="de-DE" sz="1400" dirty="0" err="1"/>
-              <a:t>Warnfeld</a:t>
-            </a:r>
-            <a:r>
-              <a:rPr lang="de-DE" sz="1400" dirty="0"/>
-              <a:t>, Schutzfeld)</a:t>
-            </a:r>
-          </a:p>
-          <a:p>
-            <a:r>
-              <a:rPr lang="de-DE" sz="1400" dirty="0"/>
-              <a:t>Interrupt</a:t>
-            </a:r>
-          </a:p>
-        </p:txBody>
-      </p:sp>
-      <p:sp>
-        <p:nvSpPr>
-          <p:cNvPr id="33" name="Rechteck: abgerundete Ecken 32">
-            <a:extLst>
-              <a:ext uri="{FF2B5EF4-FFF2-40B4-BE49-F238E27FC236}">
-                <a16:creationId xmlns:a16="http://schemas.microsoft.com/office/drawing/2014/main" id="{939A035F-454B-4CB4-AB77-4484CA73A275}"/>
-              </a:ext>
-            </a:extLst>
-          </p:cNvPr>
-          <p:cNvSpPr/>
-          <p:nvPr/>
-        </p:nvSpPr>
-        <p:spPr>
-          <a:xfrm>
-            <a:off x="7831584" y="344867"/>
-            <a:ext cx="1540276" cy="498058"/>
-          </a:xfrm>
-          <a:prstGeom prst="roundRect">
-            <a:avLst/>
-          </a:prstGeom>
-          <a:solidFill>
-            <a:srgbClr val="FFC000"/>
-          </a:solidFill>
-        </p:spPr>
-        <p:style>
-          <a:lnRef idx="2">
-            <a:schemeClr val="accent1">
-              <a:shade val="50000"/>
-            </a:schemeClr>
-          </a:lnRef>
-          <a:fillRef idx="1">
-            <a:schemeClr val="accent1"/>
-          </a:fillRef>
-          <a:effectRef idx="0">
-            <a:schemeClr val="accent1"/>
-          </a:effectRef>
-          <a:fontRef idx="minor">
-            <a:schemeClr val="lt1"/>
-          </a:fontRef>
-        </p:style>
-        <p:txBody>
-          <a:bodyPr rtlCol="0" anchor="ctr"/>
-          <a:lstStyle/>
-          <a:p>
-            <a:pPr algn="ctr"/>
-            <a:r>
-              <a:rPr lang="de-DE" dirty="0" err="1"/>
-              <a:t>Reedkontakt</a:t>
-            </a:r>
-            <a:endParaRPr lang="de-DE" dirty="0"/>
+              <a:rPr lang="de-DE" i="1" dirty="0"/>
+              <a:t>Interrupt-I/O</a:t>
+            </a:r>
           </a:p>
         </p:txBody>
       </p:sp>
       <p:cxnSp>
         <p:nvCxnSpPr>
-          <p:cNvPr id="35" name="Gerade Verbindung mit Pfeil 34">
-            <a:extLst>
-              <a:ext uri="{FF2B5EF4-FFF2-40B4-BE49-F238E27FC236}">
-                <a16:creationId xmlns:a16="http://schemas.microsoft.com/office/drawing/2014/main" id="{CB3F0452-6133-4ED9-B564-FBC8D2EB7A0E}"/>
+          <p:cNvPr id="96" name="Gerade Verbindung mit Pfeil 95">
+            <a:extLst>
+              <a:ext uri="{FF2B5EF4-FFF2-40B4-BE49-F238E27FC236}">
+                <a16:creationId xmlns:a16="http://schemas.microsoft.com/office/drawing/2014/main" id="{555F4DBD-B089-7543-A6E9-99FA902563DD}"/>
               </a:ext>
             </a:extLst>
           </p:cNvPr>
           <p:cNvCxnSpPr>
-            <a:stCxn id="33" idx="2"/>
-            <a:endCxn id="9" idx="0"/>
+            <a:cxnSpLocks/>
+            <a:stCxn id="58" idx="2"/>
+            <a:endCxn id="61" idx="0"/>
           </p:cNvCxnSpPr>
           <p:nvPr/>
         </p:nvCxnSpPr>
         <p:spPr>
           <a:xfrm>
-            <a:off x="8601722" y="842925"/>
-            <a:ext cx="0" cy="608575"/>
+            <a:off x="6956644" y="3944586"/>
+            <a:ext cx="12092" cy="1732599"/>
           </a:xfrm>
           <a:prstGeom prst="straightConnector1">
             <a:avLst/>
           </a:prstGeom>
-          <a:ln>
+          <a:ln w="57150">
+            <a:solidFill>
+              <a:schemeClr val="tx1">
+                <a:lumMod val="50000"/>
+                <a:lumOff val="50000"/>
+              </a:schemeClr>
+            </a:solidFill>
+            <a:headEnd type="triangle"/>
             <a:tailEnd type="triangle"/>
           </a:ln>
         </p:spPr>
@@ -4248,12 +5702,109 @@
           </a:fontRef>
         </p:style>
       </p:cxnSp>
-      <p:sp>
-        <p:nvSpPr>
-          <p:cNvPr id="37" name="Textfeld 36">
-            <a:extLst>
-              <a:ext uri="{FF2B5EF4-FFF2-40B4-BE49-F238E27FC236}">
-                <a16:creationId xmlns:a16="http://schemas.microsoft.com/office/drawing/2014/main" id="{2E0DF228-2247-465C-8FE5-C4C643C27DF7}"/>
+      <p:cxnSp>
+        <p:nvCxnSpPr>
+          <p:cNvPr id="104" name="Gerade Verbindung mit Pfeil 103">
+            <a:extLst>
+              <a:ext uri="{FF2B5EF4-FFF2-40B4-BE49-F238E27FC236}">
+                <a16:creationId xmlns:a16="http://schemas.microsoft.com/office/drawing/2014/main" id="{5E47742C-E776-9845-A945-925AB1A095A3}"/>
+              </a:ext>
+            </a:extLst>
+          </p:cNvPr>
+          <p:cNvCxnSpPr>
+            <a:cxnSpLocks/>
+            <a:stCxn id="60" idx="2"/>
+          </p:cNvCxnSpPr>
+          <p:nvPr/>
+        </p:nvCxnSpPr>
+        <p:spPr>
+          <a:xfrm>
+            <a:off x="8814492" y="4977633"/>
+            <a:ext cx="0" cy="699552"/>
+          </a:xfrm>
+          <a:prstGeom prst="straightConnector1">
+            <a:avLst/>
+          </a:prstGeom>
+          <a:ln w="57150">
+            <a:solidFill>
+              <a:schemeClr val="tx1">
+                <a:lumMod val="50000"/>
+                <a:lumOff val="50000"/>
+              </a:schemeClr>
+            </a:solidFill>
+            <a:headEnd type="triangle"/>
+            <a:tailEnd type="triangle"/>
+          </a:ln>
+        </p:spPr>
+        <p:style>
+          <a:lnRef idx="1">
+            <a:schemeClr val="accent1"/>
+          </a:lnRef>
+          <a:fillRef idx="0">
+            <a:schemeClr val="accent1"/>
+          </a:fillRef>
+          <a:effectRef idx="0">
+            <a:schemeClr val="accent1"/>
+          </a:effectRef>
+          <a:fontRef idx="minor">
+            <a:schemeClr val="tx1"/>
+          </a:fontRef>
+        </p:style>
+      </p:cxnSp>
+      <p:cxnSp>
+        <p:nvCxnSpPr>
+          <p:cNvPr id="109" name="Gerade Verbindung mit Pfeil 108">
+            <a:extLst>
+              <a:ext uri="{FF2B5EF4-FFF2-40B4-BE49-F238E27FC236}">
+                <a16:creationId xmlns:a16="http://schemas.microsoft.com/office/drawing/2014/main" id="{89E028C2-A945-1C44-A4A9-0F4F90833B9F}"/>
+              </a:ext>
+            </a:extLst>
+          </p:cNvPr>
+          <p:cNvCxnSpPr>
+            <a:cxnSpLocks/>
+          </p:cNvCxnSpPr>
+          <p:nvPr/>
+        </p:nvCxnSpPr>
+        <p:spPr>
+          <a:xfrm>
+            <a:off x="5100561" y="4977633"/>
+            <a:ext cx="0" cy="680561"/>
+          </a:xfrm>
+          <a:prstGeom prst="straightConnector1">
+            <a:avLst/>
+          </a:prstGeom>
+          <a:ln w="57150">
+            <a:solidFill>
+              <a:schemeClr val="tx1">
+                <a:lumMod val="50000"/>
+                <a:lumOff val="50000"/>
+              </a:schemeClr>
+            </a:solidFill>
+            <a:headEnd type="triangle"/>
+            <a:tailEnd type="triangle"/>
+          </a:ln>
+        </p:spPr>
+        <p:style>
+          <a:lnRef idx="1">
+            <a:schemeClr val="accent1"/>
+          </a:lnRef>
+          <a:fillRef idx="0">
+            <a:schemeClr val="accent1"/>
+          </a:fillRef>
+          <a:effectRef idx="0">
+            <a:schemeClr val="accent1"/>
+          </a:effectRef>
+          <a:fontRef idx="minor">
+            <a:schemeClr val="tx1"/>
+          </a:fontRef>
+        </p:style>
+      </p:cxnSp>
+      <p:sp>
+        <p:nvSpPr>
+          <p:cNvPr id="111" name="Textfeld 110">
+            <a:extLst>
+              <a:ext uri="{FF2B5EF4-FFF2-40B4-BE49-F238E27FC236}">
+                <a16:creationId xmlns:a16="http://schemas.microsoft.com/office/drawing/2014/main" id="{C6238B78-296C-8648-84DF-194A1BD70301}"/>
               </a:ext>
             </a:extLst>
           </p:cNvPr>
@@ -4262,13 +5813,15 @@
         </p:nvSpPr>
         <p:spPr>
           <a:xfrm>
-            <a:off x="8708254" y="1008712"/>
-            <a:ext cx="325730" cy="276999"/>
+            <a:off x="3420759" y="5133247"/>
+            <a:ext cx="1499641" cy="369332"/>
           </a:xfrm>
           <a:prstGeom prst="rect">
             <a:avLst/>
           </a:prstGeom>
-          <a:noFill/>
+          <a:solidFill>
+            <a:schemeClr val="bg1"/>
+          </a:solidFill>
         </p:spPr>
         <p:txBody>
           <a:bodyPr wrap="none" rtlCol="0">
@@ -4277,8 +5830,82 @@
           <a:lstStyle/>
           <a:p>
             <a:r>
-              <a:rPr lang="de-DE" sz="1200" dirty="0"/>
-              <a:t>IO</a:t>
+              <a:rPr lang="de-DE" i="1" dirty="0"/>
+              <a:t>Taktgenerator</a:t>
+            </a:r>
+          </a:p>
+        </p:txBody>
+      </p:sp>
+      <p:sp>
+        <p:nvSpPr>
+          <p:cNvPr id="112" name="Textfeld 111">
+            <a:extLst>
+              <a:ext uri="{FF2B5EF4-FFF2-40B4-BE49-F238E27FC236}">
+                <a16:creationId xmlns:a16="http://schemas.microsoft.com/office/drawing/2014/main" id="{39FDAB15-CBC8-8F4C-B8FE-DB0E51BBBCCE}"/>
+              </a:ext>
+            </a:extLst>
+          </p:cNvPr>
+          <p:cNvSpPr txBox="1"/>
+          <p:nvPr/>
+        </p:nvSpPr>
+        <p:spPr>
+          <a:xfrm>
+            <a:off x="6423847" y="4571532"/>
+            <a:ext cx="482824" cy="369332"/>
+          </a:xfrm>
+          <a:prstGeom prst="rect">
+            <a:avLst/>
+          </a:prstGeom>
+          <a:solidFill>
+            <a:schemeClr val="bg1"/>
+          </a:solidFill>
+        </p:spPr>
+        <p:txBody>
+          <a:bodyPr wrap="none" rtlCol="0">
+            <a:spAutoFit/>
+          </a:bodyPr>
+          <a:lstStyle/>
+          <a:p>
+            <a:r>
+              <a:rPr lang="de-DE" i="1" dirty="0"/>
+              <a:t>I/O</a:t>
+            </a:r>
+          </a:p>
+        </p:txBody>
+      </p:sp>
+      <p:sp>
+        <p:nvSpPr>
+          <p:cNvPr id="113" name="Textfeld 112">
+            <a:extLst>
+              <a:ext uri="{FF2B5EF4-FFF2-40B4-BE49-F238E27FC236}">
+                <a16:creationId xmlns:a16="http://schemas.microsoft.com/office/drawing/2014/main" id="{F250B08A-16BC-A248-8529-639012E0A818}"/>
+              </a:ext>
+            </a:extLst>
+          </p:cNvPr>
+          <p:cNvSpPr txBox="1"/>
+          <p:nvPr/>
+        </p:nvSpPr>
+        <p:spPr>
+          <a:xfrm>
+            <a:off x="8945703" y="5093205"/>
+            <a:ext cx="482824" cy="369332"/>
+          </a:xfrm>
+          <a:prstGeom prst="rect">
+            <a:avLst/>
+          </a:prstGeom>
+          <a:solidFill>
+            <a:schemeClr val="bg1"/>
+          </a:solidFill>
+        </p:spPr>
+        <p:txBody>
+          <a:bodyPr wrap="none" rtlCol="0">
+            <a:spAutoFit/>
+          </a:bodyPr>
+          <a:lstStyle/>
+          <a:p>
+            <a:r>
+              <a:rPr lang="de-DE" i="1" dirty="0"/>
+              <a:t>I/O</a:t>
             </a:r>
           </a:p>
         </p:txBody>
@@ -4286,7 +5913,7 @@
     </p:spTree>
     <p:extLst>
       <p:ext uri="{BB962C8B-B14F-4D97-AF65-F5344CB8AC3E}">
-        <p14:creationId xmlns:p14="http://schemas.microsoft.com/office/powerpoint/2010/main" val="764792871"/>
+        <p14:creationId xmlns:p14="http://schemas.microsoft.com/office/powerpoint/2010/main" val="3452362790"/>
       </p:ext>
     </p:extLst>
   </p:cSld>

</xml_diff>